<commit_message>
Update Recommended Budget Project.pptx
</commit_message>
<xml_diff>
--- a/Recommended Budget Project.pptx
+++ b/Recommended Budget Project.pptx
@@ -112,6 +112,11 @@
       </a:defRPr>
     </a:lvl9pPr>
   </p:defaultTextStyle>
+  <p:extLst>
+    <p:ext uri="{EFAFB233-063F-42B5-8137-9DF3F51BA10A}">
+      <p15:sldGuideLst xmlns:p15="http://schemas.microsoft.com/office/powerpoint/2012/main"/>
+    </p:ext>
+  </p:extLst>
 </p:presentation>
 </file>
 
@@ -246,7 +251,7 @@
           <a:p>
             <a:fld id="{1052E589-9C7E-4273-84F3-DF115BF0C6E0}" type="datetimeFigureOut">
               <a:rPr lang="en-US" smtClean="0"/>
-              <a:t>7/13/2020</a:t>
+              <a:t>7/14/2020</a:t>
             </a:fld>
             <a:endParaRPr lang="en-US"/>
           </a:p>
@@ -416,7 +421,7 @@
           <a:p>
             <a:fld id="{1052E589-9C7E-4273-84F3-DF115BF0C6E0}" type="datetimeFigureOut">
               <a:rPr lang="en-US" smtClean="0"/>
-              <a:t>7/13/2020</a:t>
+              <a:t>7/14/2020</a:t>
             </a:fld>
             <a:endParaRPr lang="en-US"/>
           </a:p>
@@ -596,7 +601,7 @@
           <a:p>
             <a:fld id="{1052E589-9C7E-4273-84F3-DF115BF0C6E0}" type="datetimeFigureOut">
               <a:rPr lang="en-US" smtClean="0"/>
-              <a:t>7/13/2020</a:t>
+              <a:t>7/14/2020</a:t>
             </a:fld>
             <a:endParaRPr lang="en-US"/>
           </a:p>
@@ -766,7 +771,7 @@
           <a:p>
             <a:fld id="{1052E589-9C7E-4273-84F3-DF115BF0C6E0}" type="datetimeFigureOut">
               <a:rPr lang="en-US" smtClean="0"/>
-              <a:t>7/13/2020</a:t>
+              <a:t>7/14/2020</a:t>
             </a:fld>
             <a:endParaRPr lang="en-US"/>
           </a:p>
@@ -1012,7 +1017,7 @@
           <a:p>
             <a:fld id="{1052E589-9C7E-4273-84F3-DF115BF0C6E0}" type="datetimeFigureOut">
               <a:rPr lang="en-US" smtClean="0"/>
-              <a:t>7/13/2020</a:t>
+              <a:t>7/14/2020</a:t>
             </a:fld>
             <a:endParaRPr lang="en-US"/>
           </a:p>
@@ -1244,7 +1249,7 @@
           <a:p>
             <a:fld id="{1052E589-9C7E-4273-84F3-DF115BF0C6E0}" type="datetimeFigureOut">
               <a:rPr lang="en-US" smtClean="0"/>
-              <a:t>7/13/2020</a:t>
+              <a:t>7/14/2020</a:t>
             </a:fld>
             <a:endParaRPr lang="en-US"/>
           </a:p>
@@ -1611,7 +1616,7 @@
           <a:p>
             <a:fld id="{1052E589-9C7E-4273-84F3-DF115BF0C6E0}" type="datetimeFigureOut">
               <a:rPr lang="en-US" smtClean="0"/>
-              <a:t>7/13/2020</a:t>
+              <a:t>7/14/2020</a:t>
             </a:fld>
             <a:endParaRPr lang="en-US"/>
           </a:p>
@@ -1729,7 +1734,7 @@
           <a:p>
             <a:fld id="{1052E589-9C7E-4273-84F3-DF115BF0C6E0}" type="datetimeFigureOut">
               <a:rPr lang="en-US" smtClean="0"/>
-              <a:t>7/13/2020</a:t>
+              <a:t>7/14/2020</a:t>
             </a:fld>
             <a:endParaRPr lang="en-US"/>
           </a:p>
@@ -1824,7 +1829,7 @@
           <a:p>
             <a:fld id="{1052E589-9C7E-4273-84F3-DF115BF0C6E0}" type="datetimeFigureOut">
               <a:rPr lang="en-US" smtClean="0"/>
-              <a:t>7/13/2020</a:t>
+              <a:t>7/14/2020</a:t>
             </a:fld>
             <a:endParaRPr lang="en-US"/>
           </a:p>
@@ -2101,7 +2106,7 @@
           <a:p>
             <a:fld id="{1052E589-9C7E-4273-84F3-DF115BF0C6E0}" type="datetimeFigureOut">
               <a:rPr lang="en-US" smtClean="0"/>
-              <a:t>7/13/2020</a:t>
+              <a:t>7/14/2020</a:t>
             </a:fld>
             <a:endParaRPr lang="en-US"/>
           </a:p>
@@ -2358,7 +2363,7 @@
           <a:p>
             <a:fld id="{1052E589-9C7E-4273-84F3-DF115BF0C6E0}" type="datetimeFigureOut">
               <a:rPr lang="en-US" smtClean="0"/>
-              <a:t>7/13/2020</a:t>
+              <a:t>7/14/2020</a:t>
             </a:fld>
             <a:endParaRPr lang="en-US"/>
           </a:p>
@@ -2580,7 +2585,7 @@
           <a:p>
             <a:fld id="{1052E589-9C7E-4273-84F3-DF115BF0C6E0}" type="datetimeFigureOut">
               <a:rPr lang="en-US" smtClean="0"/>
-              <a:t>7/13/2020</a:t>
+              <a:t>7/14/2020</a:t>
             </a:fld>
             <a:endParaRPr lang="en-US"/>
           </a:p>
@@ -3179,19 +3184,19 @@
         </p:nvSpPr>
         <p:spPr>
           <a:xfrm>
-            <a:off x="386069" y="1136234"/>
-            <a:ext cx="4368800" cy="1099127"/>
+            <a:off x="330144" y="1001126"/>
+            <a:ext cx="4659710" cy="1099127"/>
           </a:xfrm>
         </p:spPr>
         <p:txBody>
           <a:bodyPr>
-            <a:normAutofit/>
+            <a:normAutofit fontScale="92500"/>
           </a:bodyPr>
           <a:lstStyle/>
           <a:p>
             <a:r>
               <a:rPr lang="en-US" i="1" dirty="0"/>
-              <a:t>“Professional budgeting made easy for you!”</a:t>
+              <a:t>“Professional suggested budgeting made easy for you!”</a:t>
             </a:r>
           </a:p>
         </p:txBody>

</xml_diff>